<commit_message>
Updated slides with Bonnie's input and added what I am going to say for each slide.
</commit_message>
<xml_diff>
--- a/ASA_speed_session_compositions_2016.pptx
+++ b/ASA_speed_session_compositions_2016.pptx
@@ -534,13 +534,65 @@
           </a:bodyPr>
           <a:lstStyle/>
           <a:p>
+            <a:pPr marL="0" marR="0" lvl="0" indent="0" algn="l" defTabSz="914400" rtl="0" eaLnBrk="1" fontAlgn="auto" latinLnBrk="0" hangingPunct="1">
+              <a:lnSpc>
+                <a:spcPct val="100000"/>
+              </a:lnSpc>
+              <a:spcBef>
+                <a:spcPts val="0"/>
+              </a:spcBef>
+              <a:spcAft>
+                <a:spcPts val="0"/>
+              </a:spcAft>
+              <a:buClrTx/>
+              <a:buSzTx/>
+              <a:buFontTx/>
+              <a:buNone/>
+              <a:tabLst/>
+              <a:defRPr/>
+            </a:pPr>
+            <a:r>
+              <a:rPr lang="en-US" dirty="0" smtClean="0"/>
+              <a:t>Good morning.  I will be presenting</a:t>
+            </a:r>
+            <a:r>
+              <a:rPr lang="en-US" baseline="0" dirty="0" smtClean="0"/>
+              <a:t> our poster on relative frequency measurements: metrics for sample quality, sequencing integrity, and batch effects in targeted </a:t>
+            </a:r>
+            <a:r>
+              <a:rPr lang="en-US" baseline="0" smtClean="0"/>
+              <a:t>NGS.  </a:t>
+            </a:r>
+            <a:r>
+              <a:rPr lang="en-US" smtClean="0"/>
+              <a:t>Our </a:t>
+            </a:r>
+            <a:r>
+              <a:rPr lang="en-US" dirty="0" smtClean="0"/>
+              <a:t>poster highlights some of the advantages of understanding</a:t>
+            </a:r>
+            <a:r>
+              <a:rPr lang="en-US" baseline="0" dirty="0" smtClean="0"/>
+              <a:t> the relative frequency nature of NGS RNA-</a:t>
+            </a:r>
+            <a:r>
+              <a:rPr lang="en-US" baseline="0" dirty="0" err="1" smtClean="0"/>
+              <a:t>Seq</a:t>
+            </a:r>
+            <a:r>
+              <a:rPr lang="en-US" baseline="0" dirty="0" smtClean="0"/>
+              <a:t> data. </a:t>
+            </a:r>
+            <a:endParaRPr lang="en-US" dirty="0" smtClean="0"/>
+          </a:p>
+          <a:p>
             <a:pPr lvl="0">
               <a:spcBef>
                 <a:spcPts val="0"/>
               </a:spcBef>
               <a:buNone/>
             </a:pPr>
-            <a:endParaRPr/>
+            <a:endParaRPr dirty="0"/>
           </a:p>
         </p:txBody>
       </p:sp>
@@ -650,7 +702,15 @@
               </a:spcBef>
               <a:buNone/>
             </a:pPr>
-            <a:endParaRPr/>
+            <a:r>
+              <a:rPr lang="en-US" dirty="0" smtClean="0"/>
+              <a:t>I will begin with</a:t>
+            </a:r>
+            <a:r>
+              <a:rPr lang="en-US" baseline="0" dirty="0" smtClean="0"/>
+              <a:t> a brief background on relative frequency measurements, commonly referred to as compositions.  A composition is a vector of proportions, which necessarily means that all the components are positive, and which all the components sum to a constant.  The positivity and summation constraint have important consequences for analyses of compositions.  John Aitchison identified some of the difficulties of interpretation of the covariance structure of a composition, such as the negative bias problem;  and, as far back as 1897 Karl Pearson identified a spurious correlation problem.  Clearly, compositions require special care in the analysis. </a:t>
+            </a:r>
+            <a:endParaRPr lang="en-US" dirty="0"/>
           </a:p>
         </p:txBody>
       </p:sp>
@@ -754,13 +814,57 @@
           </a:bodyPr>
           <a:lstStyle/>
           <a:p>
+            <a:pPr marL="0" marR="0" lvl="0" indent="0" algn="l" defTabSz="914400" rtl="0" eaLnBrk="1" fontAlgn="auto" latinLnBrk="0" hangingPunct="1">
+              <a:lnSpc>
+                <a:spcPct val="100000"/>
+              </a:lnSpc>
+              <a:spcBef>
+                <a:spcPts val="0"/>
+              </a:spcBef>
+              <a:spcAft>
+                <a:spcPts val="0"/>
+              </a:spcAft>
+              <a:buClrTx/>
+              <a:buSzTx/>
+              <a:buFontTx/>
+              <a:buNone/>
+              <a:tabLst/>
+              <a:defRPr/>
+            </a:pPr>
+            <a:r>
+              <a:rPr lang="en-US" dirty="0" smtClean="0"/>
+              <a:t>We</a:t>
+            </a:r>
+            <a:r>
+              <a:rPr lang="en-US" baseline="0" dirty="0" smtClean="0"/>
+              <a:t> propose that RNA-</a:t>
+            </a:r>
+            <a:r>
+              <a:rPr lang="en-US" baseline="0" dirty="0" err="1" smtClean="0"/>
+              <a:t>seq</a:t>
+            </a:r>
+            <a:r>
+              <a:rPr lang="en-US" baseline="0" dirty="0" smtClean="0"/>
+              <a:t> data are compositions.  The data are always positive and, most importantly, arise as proportions of some limited number of available reads.  Although large, the number of reads available in a sequencing run is finite, which imposes a sum constraint.  If more reads  are allocated to 1 transcript, fewer reads are then available for the other transcripts.  As one goes up, the others must come down.  This is the signature of a composition.  Fortunately, there is already a substantial body of literature on the analysis of compositions so there are already methods for dealing with this type of data.  Specifically, we highlight two methods, the </a:t>
+            </a:r>
+            <a:r>
+              <a:rPr lang="en-US" baseline="0" dirty="0" err="1" smtClean="0"/>
+              <a:t>clr</a:t>
+            </a:r>
+            <a:r>
+              <a:rPr lang="en-US" baseline="0" dirty="0" smtClean="0"/>
+              <a:t> and the Aitchison distance.  These two methods allow us to perform many typical analyses on compositional data.</a:t>
+            </a:r>
+            <a:endParaRPr lang="en-US" dirty="0" smtClean="0"/>
+          </a:p>
+          <a:p>
             <a:pPr lvl="0">
               <a:spcBef>
                 <a:spcPts val="0"/>
               </a:spcBef>
               <a:buNone/>
             </a:pPr>
-            <a:endParaRPr/>
+            <a:endParaRPr dirty="0"/>
           </a:p>
         </p:txBody>
       </p:sp>
@@ -901,13 +1005,57 @@
           </a:bodyPr>
           <a:lstStyle/>
           <a:p>
+            <a:pPr marL="0" marR="0" lvl="0" indent="0" algn="l" defTabSz="914400" rtl="0" eaLnBrk="1" fontAlgn="auto" latinLnBrk="0" hangingPunct="1">
+              <a:lnSpc>
+                <a:spcPct val="100000"/>
+              </a:lnSpc>
+              <a:spcBef>
+                <a:spcPts val="0"/>
+              </a:spcBef>
+              <a:spcAft>
+                <a:spcPts val="0"/>
+              </a:spcAft>
+              <a:buClrTx/>
+              <a:buSzTx/>
+              <a:buFontTx/>
+              <a:buNone/>
+              <a:tabLst/>
+              <a:defRPr/>
+            </a:pPr>
+            <a:r>
+              <a:rPr lang="en-US" dirty="0" smtClean="0"/>
+              <a:t>In our poster we outline how the evaluation of</a:t>
+            </a:r>
+            <a:r>
+              <a:rPr lang="en-US" baseline="0" dirty="0" smtClean="0"/>
+              <a:t> features in RNA-</a:t>
+            </a:r>
+            <a:r>
+              <a:rPr lang="en-US" baseline="0" dirty="0" err="1" smtClean="0"/>
+              <a:t>Seq</a:t>
+            </a:r>
+            <a:r>
+              <a:rPr lang="en-US" baseline="0" dirty="0" smtClean="0"/>
+              <a:t> data can be viewed as compositions and we provide a brief outline of some of the mathematical properties.  We highlight how some operations already in use for RNA-</a:t>
+            </a:r>
+            <a:r>
+              <a:rPr lang="en-US" baseline="0" dirty="0" err="1" smtClean="0"/>
+              <a:t>Seq</a:t>
+            </a:r>
+            <a:r>
+              <a:rPr lang="en-US" baseline="0" dirty="0" smtClean="0"/>
+              <a:t> data, like the CPM transformation, are compositional operations.  We also describe how the specific geometry of compositions can be used to identify problematic samples and enhance multivariate feature evaluation.  If you want to learn more, or if you have any questions about our approach, please come see me during the poster session.</a:t>
+            </a:r>
+            <a:endParaRPr lang="en-US" dirty="0" smtClean="0"/>
+          </a:p>
+          <a:p>
             <a:pPr lvl="0">
               <a:spcBef>
                 <a:spcPts val="0"/>
               </a:spcBef>
               <a:buNone/>
             </a:pPr>
-            <a:endParaRPr/>
+            <a:endParaRPr dirty="0"/>
           </a:p>
         </p:txBody>
       </p:sp>
@@ -6741,6 +6889,13 @@
   <p:transition spd="slow">
     <p:cut/>
   </p:transition>
+  <p:timing>
+    <p:tnLst>
+      <p:par>
+        <p:cTn id="1" dur="indefinite" restart="never" nodeType="tmRoot"/>
+      </p:par>
+    </p:tnLst>
+  </p:timing>
 </p:sld>
 </file>
 
@@ -7198,6 +7353,13 @@
   <p:transition spd="slow">
     <p:cut/>
   </p:transition>
+  <p:timing>
+    <p:tnLst>
+      <p:par>
+        <p:cTn id="1" dur="indefinite" restart="never" nodeType="tmRoot"/>
+      </p:par>
+    </p:tnLst>
+  </p:timing>
 </p:sld>
 </file>
 
@@ -7574,6 +7736,13 @@
   <p:transition spd="slow">
     <p:cut/>
   </p:transition>
+  <p:timing>
+    <p:tnLst>
+      <p:par>
+        <p:cTn id="1" dur="indefinite" restart="never" nodeType="tmRoot"/>
+      </p:par>
+    </p:tnLst>
+  </p:timing>
 </p:sld>
 </file>
 
@@ -7693,8 +7862,13 @@
             </a:pPr>
             <a:r>
               <a:rPr lang="en-US" sz="2000" dirty="0"/>
-              <a:t>CPM transformation is a type of compositional transformation without some of the geometric benefits</a:t>
+              <a:t>CPM transformation is a type of compositional </a:t>
             </a:r>
+            <a:r>
+              <a:rPr lang="en-US" sz="2000" dirty="0" smtClean="0"/>
+              <a:t>transformation</a:t>
+            </a:r>
+            <a:endParaRPr lang="en-US" sz="2000" strike="sngStrike" dirty="0"/>
           </a:p>
           <a:p>
             <a:pPr>
@@ -7714,7 +7888,7 @@
             </a:pPr>
             <a:r>
               <a:rPr lang="en-US" sz="2000" dirty="0"/>
-              <a:t>Outlier and influential sample features can be identified using well-established metrics on transformed data </a:t>
+              <a:t>Outlier and influential sample features can be identified using well-established normal theory on transformed data </a:t>
             </a:r>
           </a:p>
           <a:p>
@@ -7781,6 +7955,13 @@
   <p:transition spd="slow">
     <p:cut/>
   </p:transition>
+  <p:timing>
+    <p:tnLst>
+      <p:par>
+        <p:cTn id="1" dur="indefinite" restart="never" nodeType="tmRoot"/>
+      </p:par>
+    </p:tnLst>
+  </p:timing>
 </p:sld>
 </file>
 

</xml_diff>

<commit_message>
slight changes to speed ppt
</commit_message>
<xml_diff>
--- a/ASA_speed_session_compositions_2016.pptx
+++ b/ASA_speed_session_compositions_2016.pptx
@@ -557,19 +557,11 @@
             </a:r>
             <a:r>
               <a:rPr lang="en-US" baseline="0" dirty="0" smtClean="0"/>
-              <a:t> our poster on relative frequency measurements: metrics for sample quality, sequencing integrity, and batch effects in targeted </a:t>
-            </a:r>
-            <a:r>
-              <a:rPr lang="en-US" baseline="0" smtClean="0"/>
-              <a:t>NGS.  </a:t>
-            </a:r>
-            <a:r>
-              <a:rPr lang="en-US" smtClean="0"/>
-              <a:t>Our </a:t>
+              <a:t> our poster on relative frequency measurements: metrics for sample quality, sequencing integrity, and batch effects in targeted NGS.  </a:t>
             </a:r>
             <a:r>
               <a:rPr lang="en-US" dirty="0" smtClean="0"/>
-              <a:t>poster highlights some of the advantages of understanding</a:t>
+              <a:t>Our poster highlights some of the advantages of understanding</a:t>
             </a:r>
             <a:r>
               <a:rPr lang="en-US" baseline="0" dirty="0" smtClean="0"/>
@@ -1024,11 +1016,19 @@
             </a:pPr>
             <a:r>
               <a:rPr lang="en-US" dirty="0" smtClean="0"/>
-              <a:t>In our poster we outline how the evaluation of</a:t>
+              <a:t>In our poster we outline how </a:t>
+            </a:r>
+            <a:r>
+              <a:rPr lang="en-US" smtClean="0"/>
+              <a:t>the </a:t>
+            </a:r>
+            <a:r>
+              <a:rPr lang="en-US" baseline="0" smtClean="0"/>
+              <a:t>features </a:t>
             </a:r>
             <a:r>
               <a:rPr lang="en-US" baseline="0" dirty="0" smtClean="0"/>
-              <a:t> features in RNA-</a:t>
+              <a:t>in RNA-</a:t>
             </a:r>
             <a:r>
               <a:rPr lang="en-US" baseline="0" dirty="0" err="1" smtClean="0"/>

</xml_diff>

<commit_message>
Culled more words (and added a few) from the poster
</commit_message>
<xml_diff>
--- a/ASA_speed_session_compositions_2016.pptx
+++ b/ASA_speed_session_compositions_2016.pptx
@@ -552,30 +552,46 @@
               <a:defRPr/>
             </a:pPr>
             <a:r>
-              <a:rPr lang="en-US" dirty="0" smtClean="0"/>
+              <a:rPr lang="en-US" dirty="0"/>
               <a:t>Good morning.  I will be presenting</a:t>
             </a:r>
             <a:r>
-              <a:rPr lang="en-US" baseline="0" dirty="0" smtClean="0"/>
-              <a:t> our poster on relative frequency measurements: metrics for sample quality, sequencing integrity, and batch effects in targeted NGS.  </a:t>
+              <a:rPr lang="en-US" baseline="0" dirty="0"/>
+              <a:t> our </a:t>
             </a:r>
             <a:r>
-              <a:rPr lang="en-US" dirty="0" smtClean="0"/>
+              <a:rPr lang="en-US" baseline="0"/>
+              <a:t>poster on: </a:t>
+            </a:r>
+            <a:r>
+              <a:rPr lang="en-US" baseline="0" dirty="0"/>
+              <a:t>R</a:t>
+            </a:r>
+            <a:r>
+              <a:rPr lang="en-US" baseline="0"/>
+              <a:t>elative </a:t>
+            </a:r>
+            <a:r>
+              <a:rPr lang="en-US" baseline="0" dirty="0"/>
+              <a:t>frequency measurements: metrics for sample quality, sequencing integrity, and batch effects in targeted NGS.  </a:t>
+            </a:r>
+            <a:r>
+              <a:rPr lang="en-US" dirty="0"/>
               <a:t>Our poster highlights some of the advantages of understanding</a:t>
             </a:r>
             <a:r>
-              <a:rPr lang="en-US" baseline="0" dirty="0" smtClean="0"/>
+              <a:rPr lang="en-US" baseline="0" dirty="0"/>
               <a:t> the relative frequency nature of NGS RNA-</a:t>
             </a:r>
             <a:r>
-              <a:rPr lang="en-US" baseline="0" dirty="0" err="1" smtClean="0"/>
+              <a:rPr lang="en-US" baseline="0" dirty="0" err="1"/>
               <a:t>Seq</a:t>
             </a:r>
             <a:r>
-              <a:rPr lang="en-US" baseline="0" dirty="0" smtClean="0"/>
+              <a:rPr lang="en-US" baseline="0" dirty="0"/>
               <a:t> data. </a:t>
             </a:r>
-            <a:endParaRPr lang="en-US" dirty="0" smtClean="0"/>
+            <a:endParaRPr lang="en-US" dirty="0"/>
           </a:p>
           <a:p>
             <a:pPr lvl="0">
@@ -695,11 +711,11 @@
               <a:buNone/>
             </a:pPr>
             <a:r>
-              <a:rPr lang="en-US" dirty="0" smtClean="0"/>
+              <a:rPr lang="en-US" dirty="0"/>
               <a:t>I will begin with</a:t>
             </a:r>
             <a:r>
-              <a:rPr lang="en-US" baseline="0" dirty="0" smtClean="0"/>
+              <a:rPr lang="en-US" baseline="0" dirty="0"/>
               <a:t> a brief background on relative frequency measurements, commonly referred to as compositions.  A composition is a vector of proportions, which necessarily means that all the components are positive, and which all the components sum to a constant.  The positivity and summation constraint have important consequences for analyses of compositions.  John Aitchison identified some of the difficulties of interpretation of the covariance structure of a composition, such as the negative bias problem;  and, as far back as 1897 Karl Pearson identified a spurious correlation problem.  Clearly, compositions require special care in the analysis. </a:t>
             </a:r>
             <a:endParaRPr lang="en-US" dirty="0"/>
@@ -824,30 +840,30 @@
               <a:defRPr/>
             </a:pPr>
             <a:r>
-              <a:rPr lang="en-US" dirty="0" smtClean="0"/>
+              <a:rPr lang="en-US" dirty="0"/>
               <a:t>We</a:t>
             </a:r>
             <a:r>
-              <a:rPr lang="en-US" baseline="0" dirty="0" smtClean="0"/>
+              <a:rPr lang="en-US" baseline="0" dirty="0"/>
               <a:t> propose that RNA-</a:t>
             </a:r>
             <a:r>
-              <a:rPr lang="en-US" baseline="0" dirty="0" err="1" smtClean="0"/>
+              <a:rPr lang="en-US" baseline="0" dirty="0" err="1"/>
               <a:t>seq</a:t>
             </a:r>
             <a:r>
-              <a:rPr lang="en-US" baseline="0" dirty="0" smtClean="0"/>
+              <a:rPr lang="en-US" baseline="0" dirty="0"/>
               <a:t> data are compositions.  The data are always positive and, most importantly, arise as proportions of some limited number of available reads.  Although large, the number of reads available in a sequencing run is finite, which imposes a sum constraint.  If more reads  are allocated to 1 transcript, fewer reads are then available for the other transcripts.  As one goes up, the others must come down.  This is the signature of a composition.  Fortunately, there is already a substantial body of literature on the analysis of compositions so there are already methods for dealing with this type of data.  Specifically, we highlight two methods, the </a:t>
             </a:r>
             <a:r>
-              <a:rPr lang="en-US" baseline="0" dirty="0" err="1" smtClean="0"/>
+              <a:rPr lang="en-US" baseline="0" dirty="0" err="1"/>
               <a:t>clr</a:t>
             </a:r>
             <a:r>
-              <a:rPr lang="en-US" baseline="0" dirty="0" smtClean="0"/>
+              <a:rPr lang="en-US" baseline="0" dirty="0"/>
               <a:t> and the Aitchison distance.  These two methods allow us to perform many typical analyses on compositional data.</a:t>
             </a:r>
-            <a:endParaRPr lang="en-US" dirty="0" smtClean="0"/>
+            <a:endParaRPr lang="en-US" dirty="0"/>
           </a:p>
           <a:p>
             <a:pPr lvl="0">
@@ -1015,38 +1031,38 @@
               <a:defRPr/>
             </a:pPr>
             <a:r>
-              <a:rPr lang="en-US" dirty="0" smtClean="0"/>
+              <a:rPr lang="en-US" dirty="0"/>
               <a:t>In our poster we outline how </a:t>
             </a:r>
             <a:r>
-              <a:rPr lang="en-US" smtClean="0"/>
+              <a:rPr lang="en-US"/>
               <a:t>the </a:t>
             </a:r>
             <a:r>
-              <a:rPr lang="en-US" baseline="0" smtClean="0"/>
+              <a:rPr lang="en-US" baseline="0"/>
               <a:t>features </a:t>
             </a:r>
             <a:r>
-              <a:rPr lang="en-US" baseline="0" dirty="0" smtClean="0"/>
+              <a:rPr lang="en-US" baseline="0" dirty="0"/>
               <a:t>in RNA-</a:t>
             </a:r>
             <a:r>
-              <a:rPr lang="en-US" baseline="0" dirty="0" err="1" smtClean="0"/>
+              <a:rPr lang="en-US" baseline="0" dirty="0" err="1"/>
               <a:t>Seq</a:t>
             </a:r>
             <a:r>
-              <a:rPr lang="en-US" baseline="0" dirty="0" smtClean="0"/>
+              <a:rPr lang="en-US" baseline="0" dirty="0"/>
               <a:t> data can be viewed as compositions and we provide a brief outline of some of the mathematical properties.  We highlight how some operations already in use for RNA-</a:t>
             </a:r>
             <a:r>
-              <a:rPr lang="en-US" baseline="0" dirty="0" err="1" smtClean="0"/>
+              <a:rPr lang="en-US" baseline="0" dirty="0" err="1"/>
               <a:t>Seq</a:t>
             </a:r>
             <a:r>
-              <a:rPr lang="en-US" baseline="0" dirty="0" smtClean="0"/>
+              <a:rPr lang="en-US" baseline="0" dirty="0"/>
               <a:t> data, like the CPM transformation, are compositional operations.  We also describe how the specific geometry of compositions can be used to identify problematic samples and enhance multivariate feature evaluation.  If you want to learn more, or if you have any questions about our approach, please come see me during the poster session.</a:t>
             </a:r>
-            <a:endParaRPr lang="en-US" dirty="0" smtClean="0"/>
+            <a:endParaRPr lang="en-US" dirty="0"/>
           </a:p>
           <a:p>
             <a:pPr lvl="0">
@@ -6889,13 +6905,6 @@
   <p:transition spd="slow">
     <p:cut/>
   </p:transition>
-  <p:timing>
-    <p:tnLst>
-      <p:par>
-        <p:cTn id="1" dur="indefinite" restart="never" nodeType="tmRoot"/>
-      </p:par>
-    </p:tnLst>
-  </p:timing>
 </p:sld>
 </file>
 
@@ -7353,13 +7362,6 @@
   <p:transition spd="slow">
     <p:cut/>
   </p:transition>
-  <p:timing>
-    <p:tnLst>
-      <p:par>
-        <p:cTn id="1" dur="indefinite" restart="never" nodeType="tmRoot"/>
-      </p:par>
-    </p:tnLst>
-  </p:timing>
 </p:sld>
 </file>
 
@@ -7736,13 +7738,6 @@
   <p:transition spd="slow">
     <p:cut/>
   </p:transition>
-  <p:timing>
-    <p:tnLst>
-      <p:par>
-        <p:cTn id="1" dur="indefinite" restart="never" nodeType="tmRoot"/>
-      </p:par>
-    </p:tnLst>
-  </p:timing>
 </p:sld>
 </file>
 
@@ -7862,11 +7857,7 @@
             </a:pPr>
             <a:r>
               <a:rPr lang="en-US" sz="2000" dirty="0"/>
-              <a:t>CPM transformation is a type of compositional </a:t>
-            </a:r>
-            <a:r>
-              <a:rPr lang="en-US" sz="2000" dirty="0" smtClean="0"/>
-              <a:t>transformation</a:t>
+              <a:t>CPM transformation is a type of compositional transformation</a:t>
             </a:r>
             <a:endParaRPr lang="en-US" sz="2000" strike="sngStrike" dirty="0"/>
           </a:p>
@@ -7955,13 +7946,6 @@
   <p:transition spd="slow">
     <p:cut/>
   </p:transition>
-  <p:timing>
-    <p:tnLst>
-      <p:par>
-        <p:cTn id="1" dur="indefinite" restart="never" nodeType="tmRoot"/>
-      </p:par>
-    </p:tnLst>
-  </p:timing>
 </p:sld>
 </file>
 

</xml_diff>

<commit_message>
Update after giving poster
</commit_message>
<xml_diff>
--- a/ASA_speed_session_compositions_2016.pptx
+++ b/ASA_speed_session_compositions_2016.pptx
@@ -6,13 +6,14 @@
     <p:sldMasterId id="2147483656" r:id="rId2"/>
   </p:sldMasterIdLst>
   <p:notesMasterIdLst>
-    <p:notesMasterId r:id="rId7"/>
+    <p:notesMasterId r:id="rId8"/>
   </p:notesMasterIdLst>
   <p:sldIdLst>
     <p:sldId id="256" r:id="rId3"/>
     <p:sldId id="264" r:id="rId4"/>
     <p:sldId id="257" r:id="rId5"/>
     <p:sldId id="295" r:id="rId6"/>
+    <p:sldId id="296" r:id="rId7"/>
   </p:sldIdLst>
   <p:sldSz cx="9144000" cy="6858000" type="screen4x3"/>
   <p:notesSz cx="7315200" cy="9601200"/>
@@ -557,23 +558,27 @@
             </a:r>
             <a:r>
               <a:rPr lang="en-US" baseline="0" dirty="0"/>
-              <a:t> our </a:t>
+              <a:t> our poster on: NGS RNA-</a:t>
+            </a:r>
+            <a:r>
+              <a:rPr lang="en-US" baseline="0" dirty="0" err="1"/>
+              <a:t>Seq</a:t>
+            </a:r>
+            <a:r>
+              <a:rPr lang="en-US" baseline="0" dirty="0"/>
+              <a:t> Data as Relative </a:t>
             </a:r>
             <a:r>
               <a:rPr lang="en-US" baseline="0"/>
-              <a:t>poster on: </a:t>
+              <a:t>Abundances: Implications </a:t>
             </a:r>
             <a:r>
               <a:rPr lang="en-US" baseline="0" dirty="0"/>
-              <a:t>R</a:t>
+              <a:t>for quality control </a:t>
             </a:r>
             <a:r>
               <a:rPr lang="en-US" baseline="0"/>
-              <a:t>elative </a:t>
-            </a:r>
-            <a:r>
-              <a:rPr lang="en-US" baseline="0" dirty="0"/>
-              <a:t>frequency measurements: metrics for sample quality, sequencing integrity, and batch effects in targeted NGS.  </a:t>
+              <a:t>and analysis.  </a:t>
             </a:r>
             <a:r>
               <a:rPr lang="en-US" dirty="0"/>
@@ -1032,19 +1037,11 @@
             </a:pPr>
             <a:r>
               <a:rPr lang="en-US" dirty="0"/>
-              <a:t>In our poster we outline how </a:t>
-            </a:r>
-            <a:r>
-              <a:rPr lang="en-US"/>
-              <a:t>the </a:t>
-            </a:r>
-            <a:r>
-              <a:rPr lang="en-US" baseline="0"/>
-              <a:t>features </a:t>
+              <a:t>In our poster we outline how the </a:t>
             </a:r>
             <a:r>
               <a:rPr lang="en-US" baseline="0" dirty="0"/>
-              <a:t>in RNA-</a:t>
+              <a:t>features in RNA-</a:t>
             </a:r>
             <a:r>
               <a:rPr lang="en-US" baseline="0" dirty="0" err="1"/>
@@ -1052,7 +1049,7 @@
             </a:r>
             <a:r>
               <a:rPr lang="en-US" baseline="0" dirty="0"/>
-              <a:t> data can be viewed as compositions and we provide a brief outline of some of the mathematical properties.  We highlight how some operations already in use for RNA-</a:t>
+              <a:t> data can be viewed as compositions and we provide a brief introduction to some of the mathematical properties.  We highlight how some operations already in use for RNA-</a:t>
             </a:r>
             <a:r>
               <a:rPr lang="en-US" baseline="0" dirty="0" err="1"/>
@@ -6794,7 +6791,7 @@
               <a:buNone/>
             </a:pPr>
             <a:r>
-              <a:rPr lang="en-US" sz="3000" b="1">
+              <a:rPr lang="en-US" sz="3000" b="1" dirty="0">
                 <a:solidFill>
                   <a:schemeClr val="accent1"/>
                 </a:solidFill>
@@ -6803,17 +6800,62 @@
                 <a:cs typeface="Trebuchet MS"/>
                 <a:sym typeface="Trebuchet MS"/>
               </a:rPr>
-              <a:t>Relative frequency measurements: Metrics for sample quality, sequencing integrity, and batch effects in targeted NGS</a:t>
+              <a:t>NGS RNA-</a:t>
             </a:r>
+            <a:r>
+              <a:rPr lang="en-US" sz="3000" b="1" dirty="0" err="1">
+                <a:solidFill>
+                  <a:schemeClr val="accent1"/>
+                </a:solidFill>
+                <a:latin typeface="Trebuchet MS"/>
+                <a:ea typeface="Trebuchet MS"/>
+                <a:cs typeface="Trebuchet MS"/>
+                <a:sym typeface="Trebuchet MS"/>
+              </a:rPr>
+              <a:t>Seq</a:t>
+            </a:r>
+            <a:r>
+              <a:rPr lang="en-US" sz="3000" b="1" dirty="0">
+                <a:solidFill>
+                  <a:schemeClr val="accent1"/>
+                </a:solidFill>
+                <a:latin typeface="Trebuchet MS"/>
+                <a:ea typeface="Trebuchet MS"/>
+                <a:cs typeface="Trebuchet MS"/>
+                <a:sym typeface="Trebuchet MS"/>
+              </a:rPr>
+              <a:t> Data as Relative Abundances:</a:t>
+            </a:r>
           </a:p>
           <a:p>
             <a:pPr marL="0" marR="0" lvl="0" indent="0" algn="l" rtl="0">
               <a:spcBef>
                 <a:spcPts val="0"/>
               </a:spcBef>
+              <a:buSzPct val="25000"/>
               <a:buNone/>
             </a:pPr>
-            <a:endParaRPr sz="2400" b="1">
+            <a:r>
+              <a:rPr lang="en-US" sz="3000" b="1" dirty="0">
+                <a:solidFill>
+                  <a:schemeClr val="accent1"/>
+                </a:solidFill>
+                <a:latin typeface="Trebuchet MS"/>
+                <a:ea typeface="Trebuchet MS"/>
+                <a:cs typeface="Trebuchet MS"/>
+                <a:sym typeface="Trebuchet MS"/>
+              </a:rPr>
+              <a:t>Implications for quality control and analysis</a:t>
+            </a:r>
+          </a:p>
+          <a:p>
+            <a:pPr marL="0" marR="0" lvl="0" indent="0" algn="l" rtl="0">
+              <a:spcBef>
+                <a:spcPts val="0"/>
+              </a:spcBef>
+              <a:buNone/>
+            </a:pPr>
+            <a:endParaRPr sz="2400" b="1" dirty="0">
               <a:solidFill>
                 <a:schemeClr val="accent1"/>
               </a:solidFill>
@@ -6832,7 +6874,7 @@
               <a:buNone/>
             </a:pPr>
             <a:r>
-              <a:rPr lang="en-US" sz="2400" i="1">
+              <a:rPr lang="en-US" sz="2400" i="1" dirty="0">
                 <a:solidFill>
                   <a:srgbClr val="595959"/>
                 </a:solidFill>
@@ -6841,8 +6883,77 @@
                 <a:cs typeface="Trebuchet MS"/>
                 <a:sym typeface="Trebuchet MS"/>
               </a:rPr>
-              <a:t>Bonnie LaFleur, Dominic LaRoche, Kurt Michels, Shripad Sinari, and Dean Billheimer</a:t>
+              <a:t>Bonnie LaFleur, Dominic LaRoche*, Kurt Michels, </a:t>
             </a:r>
+            <a:r>
+              <a:rPr lang="en-US" sz="2400" i="1" dirty="0" err="1">
+                <a:solidFill>
+                  <a:srgbClr val="595959"/>
+                </a:solidFill>
+                <a:latin typeface="Trebuchet MS"/>
+                <a:ea typeface="Trebuchet MS"/>
+                <a:cs typeface="Trebuchet MS"/>
+                <a:sym typeface="Trebuchet MS"/>
+              </a:rPr>
+              <a:t>Shripad</a:t>
+            </a:r>
+            <a:r>
+              <a:rPr lang="en-US" sz="2400" i="1" dirty="0">
+                <a:solidFill>
+                  <a:srgbClr val="595959"/>
+                </a:solidFill>
+                <a:latin typeface="Trebuchet MS"/>
+                <a:ea typeface="Trebuchet MS"/>
+                <a:cs typeface="Trebuchet MS"/>
+                <a:sym typeface="Trebuchet MS"/>
+              </a:rPr>
+              <a:t> </a:t>
+            </a:r>
+            <a:r>
+              <a:rPr lang="en-US" sz="2400" i="1" dirty="0" err="1">
+                <a:solidFill>
+                  <a:srgbClr val="595959"/>
+                </a:solidFill>
+                <a:latin typeface="Trebuchet MS"/>
+                <a:ea typeface="Trebuchet MS"/>
+                <a:cs typeface="Trebuchet MS"/>
+                <a:sym typeface="Trebuchet MS"/>
+              </a:rPr>
+              <a:t>Sinari</a:t>
+            </a:r>
+            <a:r>
+              <a:rPr lang="en-US" sz="2400" i="1" dirty="0">
+                <a:solidFill>
+                  <a:srgbClr val="595959"/>
+                </a:solidFill>
+                <a:latin typeface="Trebuchet MS"/>
+                <a:ea typeface="Trebuchet MS"/>
+                <a:cs typeface="Trebuchet MS"/>
+                <a:sym typeface="Trebuchet MS"/>
+              </a:rPr>
+              <a:t>, and Dean </a:t>
+            </a:r>
+            <a:r>
+              <a:rPr lang="en-US" sz="2400" i="1" dirty="0" err="1">
+                <a:solidFill>
+                  <a:srgbClr val="595959"/>
+                </a:solidFill>
+                <a:latin typeface="Trebuchet MS"/>
+                <a:ea typeface="Trebuchet MS"/>
+                <a:cs typeface="Trebuchet MS"/>
+                <a:sym typeface="Trebuchet MS"/>
+              </a:rPr>
+              <a:t>Billheimer</a:t>
+            </a:r>
+            <a:endParaRPr lang="en-US" sz="2400" i="1" dirty="0">
+              <a:solidFill>
+                <a:srgbClr val="595959"/>
+              </a:solidFill>
+              <a:latin typeface="Trebuchet MS"/>
+              <a:ea typeface="Trebuchet MS"/>
+              <a:cs typeface="Trebuchet MS"/>
+              <a:sym typeface="Trebuchet MS"/>
+            </a:endParaRPr>
           </a:p>
           <a:p>
             <a:pPr marL="0" marR="0" lvl="0" indent="0" algn="l" rtl="0">
@@ -6853,7 +6964,7 @@
               <a:buNone/>
             </a:pPr>
             <a:r>
-              <a:rPr lang="en-US" sz="2400" i="1">
+              <a:rPr lang="en-US" sz="2400" i="1" dirty="0">
                 <a:solidFill>
                   <a:srgbClr val="595959"/>
                 </a:solidFill>
@@ -6863,6 +6974,45 @@
                 <a:sym typeface="Trebuchet MS"/>
               </a:rPr>
               <a:t>(16 May 2016)</a:t>
+            </a:r>
+          </a:p>
+          <a:p>
+            <a:pPr marL="0" marR="0" lvl="0" indent="0" algn="l" rtl="0">
+              <a:spcBef>
+                <a:spcPts val="0"/>
+              </a:spcBef>
+              <a:buSzPct val="25000"/>
+              <a:buNone/>
+            </a:pPr>
+            <a:endParaRPr lang="en-US" sz="2400" i="1" dirty="0">
+              <a:solidFill>
+                <a:srgbClr val="595959"/>
+              </a:solidFill>
+              <a:latin typeface="Trebuchet MS"/>
+              <a:ea typeface="Trebuchet MS"/>
+              <a:cs typeface="Trebuchet MS"/>
+              <a:sym typeface="Trebuchet MS"/>
+            </a:endParaRPr>
+          </a:p>
+          <a:p>
+            <a:pPr marL="0" marR="0" lvl="0" indent="0" algn="l" rtl="0">
+              <a:spcBef>
+                <a:spcPts val="0"/>
+              </a:spcBef>
+              <a:buSzPct val="25000"/>
+              <a:buNone/>
+            </a:pPr>
+            <a:r>
+              <a:rPr lang="en-US" sz="2400" i="1" dirty="0">
+                <a:solidFill>
+                  <a:srgbClr val="595959"/>
+                </a:solidFill>
+                <a:latin typeface="Trebuchet MS"/>
+                <a:ea typeface="Trebuchet MS"/>
+                <a:cs typeface="Trebuchet MS"/>
+                <a:sym typeface="Trebuchet MS"/>
+              </a:rPr>
+              <a:t>*dlaroche@email.arizona.edu</a:t>
             </a:r>
           </a:p>
         </p:txBody>
@@ -7827,11 +7977,11 @@
             </a:pPr>
             <a:r>
               <a:rPr lang="en-US" sz="2400" dirty="0"/>
-              <a:t> Evaluation of features in </a:t>
+              <a:t> Features in RNA-</a:t>
             </a:r>
             <a:r>
               <a:rPr lang="en-US" sz="2400" dirty="0" err="1"/>
-              <a:t>RNASeq</a:t>
+              <a:t>Seq</a:t>
             </a:r>
             <a:r>
               <a:rPr lang="en-US" sz="2400" dirty="0"/>
@@ -7868,7 +8018,7 @@
             </a:pPr>
             <a:r>
               <a:rPr lang="en-US" sz="2400" dirty="0"/>
-              <a:t> Quality control metrics can be viewed as detection of unexpected data features</a:t>
+              <a:t> Quality control metrics can be derived from properties of a composition</a:t>
             </a:r>
           </a:p>
           <a:p>
@@ -7946,6 +8096,193 @@
   <p:transition spd="slow">
     <p:cut/>
   </p:transition>
+</p:sld>
+</file>
+
+<file path=ppt/slides/slide5.xml><?xml version="1.0" encoding="utf-8"?>
+<p:sld xmlns:a="http://schemas.openxmlformats.org/drawingml/2006/main" xmlns:r="http://schemas.openxmlformats.org/officeDocument/2006/relationships" xmlns:p="http://schemas.openxmlformats.org/presentationml/2006/main">
+  <p:cSld>
+    <p:spTree>
+      <p:nvGrpSpPr>
+        <p:cNvPr id="1" name=""/>
+        <p:cNvGrpSpPr/>
+        <p:nvPr/>
+      </p:nvGrpSpPr>
+      <p:grpSpPr>
+        <a:xfrm>
+          <a:off x="0" y="0"/>
+          <a:ext cx="0" cy="0"/>
+          <a:chOff x="0" y="0"/>
+          <a:chExt cx="0" cy="0"/>
+        </a:xfrm>
+      </p:grpSpPr>
+      <p:sp>
+        <p:nvSpPr>
+          <p:cNvPr id="2" name="Text Placeholder 1"/>
+          <p:cNvSpPr>
+            <a:spLocks noGrp="1"/>
+          </p:cNvSpPr>
+          <p:nvPr>
+            <p:ph type="body" idx="1"/>
+          </p:nvPr>
+        </p:nvSpPr>
+        <p:spPr>
+          <a:xfrm>
+            <a:off x="457200" y="1546395"/>
+            <a:ext cx="8128000" cy="4908550"/>
+          </a:xfrm>
+        </p:spPr>
+        <p:txBody>
+          <a:bodyPr/>
+          <a:lstStyle/>
+          <a:p>
+            <a:pPr marL="177800" indent="0">
+              <a:buNone/>
+            </a:pPr>
+            <a:r>
+              <a:rPr lang="en-US" u="sng" dirty="0"/>
+              <a:t>Session Info</a:t>
+            </a:r>
+          </a:p>
+          <a:p>
+            <a:pPr marL="177800" indent="0">
+              <a:buNone/>
+            </a:pPr>
+            <a:r>
+              <a:rPr lang="en-US" dirty="0">
+                <a:solidFill>
+                  <a:srgbClr val="0070C0"/>
+                </a:solidFill>
+              </a:rPr>
+              <a:t>Session 375</a:t>
+            </a:r>
+          </a:p>
+          <a:p>
+            <a:pPr marL="177800" indent="0">
+              <a:buNone/>
+            </a:pPr>
+            <a:r>
+              <a:rPr lang="en-US" dirty="0">
+                <a:solidFill>
+                  <a:srgbClr val="0070C0"/>
+                </a:solidFill>
+              </a:rPr>
+              <a:t>10:30am -12:20pm</a:t>
+            </a:r>
+          </a:p>
+          <a:p>
+            <a:pPr marL="177800" indent="0">
+              <a:buNone/>
+            </a:pPr>
+            <a:endParaRPr lang="en-US" dirty="0"/>
+          </a:p>
+          <a:p>
+            <a:pPr marL="177800" indent="0">
+              <a:buNone/>
+            </a:pPr>
+            <a:r>
+              <a:rPr lang="en-US" u="sng" dirty="0"/>
+              <a:t>Contact Info</a:t>
+            </a:r>
+          </a:p>
+          <a:p>
+            <a:pPr marL="177800" indent="0">
+              <a:buNone/>
+            </a:pPr>
+            <a:r>
+              <a:rPr lang="en-US" dirty="0">
+                <a:hlinkClick r:id="rId2"/>
+              </a:rPr>
+              <a:t>dlaroche@htgmolecular.com</a:t>
+            </a:r>
+            <a:endParaRPr lang="en-US" dirty="0"/>
+          </a:p>
+          <a:p>
+            <a:pPr marL="177800" indent="0">
+              <a:buNone/>
+            </a:pPr>
+            <a:endParaRPr lang="en-US" dirty="0"/>
+          </a:p>
+        </p:txBody>
+      </p:sp>
+      <p:sp>
+        <p:nvSpPr>
+          <p:cNvPr id="4" name="Title 3"/>
+          <p:cNvSpPr>
+            <a:spLocks noGrp="1"/>
+          </p:cNvSpPr>
+          <p:nvPr>
+            <p:ph type="title"/>
+          </p:nvPr>
+        </p:nvSpPr>
+        <p:spPr/>
+        <p:txBody>
+          <a:bodyPr/>
+          <a:lstStyle/>
+          <a:p>
+            <a:r>
+              <a:rPr lang="en-US" dirty="0"/>
+              <a:t>Contact Information</a:t>
+            </a:r>
+          </a:p>
+        </p:txBody>
+      </p:sp>
+      <p:sp>
+        <p:nvSpPr>
+          <p:cNvPr id="6" name="Slide Number Placeholder 5"/>
+          <p:cNvSpPr>
+            <a:spLocks noGrp="1"/>
+          </p:cNvSpPr>
+          <p:nvPr>
+            <p:ph type="sldNum" idx="12"/>
+          </p:nvPr>
+        </p:nvSpPr>
+        <p:spPr/>
+        <p:txBody>
+          <a:bodyPr/>
+          <a:lstStyle/>
+          <a:p>
+            <a:pPr marL="0" marR="0" lvl="0" indent="0" algn="r" rtl="0">
+              <a:spcBef>
+                <a:spcPts val="0"/>
+              </a:spcBef>
+              <a:buSzPct val="25000"/>
+              <a:buNone/>
+            </a:pPr>
+            <a:fld id="{00000000-1234-1234-1234-123412341234}" type="slidenum">
+              <a:rPr lang="en-US" sz="1200" smtClean="0">
+                <a:solidFill>
+                  <a:srgbClr val="888888"/>
+                </a:solidFill>
+                <a:latin typeface="Trebuchet MS"/>
+                <a:ea typeface="Trebuchet MS"/>
+                <a:cs typeface="Trebuchet MS"/>
+                <a:sym typeface="Trebuchet MS"/>
+              </a:rPr>
+              <a:t>5</a:t>
+            </a:fld>
+            <a:endParaRPr lang="en-US" sz="1200">
+              <a:solidFill>
+                <a:srgbClr val="888888"/>
+              </a:solidFill>
+              <a:latin typeface="Trebuchet MS"/>
+              <a:ea typeface="Trebuchet MS"/>
+              <a:cs typeface="Trebuchet MS"/>
+              <a:sym typeface="Trebuchet MS"/>
+            </a:endParaRPr>
+          </a:p>
+        </p:txBody>
+      </p:sp>
+    </p:spTree>
+    <p:extLst>
+      <p:ext uri="{BB962C8B-B14F-4D97-AF65-F5344CB8AC3E}">
+        <p14:creationId xmlns:p14="http://schemas.microsoft.com/office/powerpoint/2010/main" val="3232636103"/>
+      </p:ext>
+    </p:extLst>
+  </p:cSld>
+  <p:clrMapOvr>
+    <a:masterClrMapping/>
+  </p:clrMapOvr>
 </p:sld>
 </file>
 

</xml_diff>